<commit_message>
adding standalone-war.war to EAP and OS presos and minor PPT updates
</commit_message>
<xml_diff>
--- a/presentations/EAP/JBoss_ACB_Presentation-2015.pptx
+++ b/presentations/EAP/JBoss_ACB_Presentation-2015.pptx
@@ -204,7 +204,7 @@
           <a:p>
             <a:fld id="{2B9CE4E9-BE21-4E98-8544-97419789DB11}" type="datetimeFigureOut">
               <a:rPr lang="en-US" smtClean="0"/>
-              <a:t>7/16/15</a:t>
+              <a:t>8/2/15</a:t>
             </a:fld>
             <a:endParaRPr lang="en-US"/>
           </a:p>
@@ -369,7 +369,7 @@
           <a:p>
             <a:fld id="{FB397A7E-2907-4785-9DE4-9BC6001D569E}" type="datetimeFigureOut">
               <a:rPr lang="en-US" smtClean="0"/>
-              <a:t>7/16/15</a:t>
+              <a:t>8/2/15</a:t>
             </a:fld>
             <a:endParaRPr lang="en-US"/>
           </a:p>
@@ -3265,8 +3265,21 @@
           <a:p>
             <a:r>
               <a:rPr lang="en-US" dirty="0" smtClean="0"/>
-              <a:t>Based on community project JBoss AS 7</a:t>
-            </a:r>
+              <a:t>Based on community project JBoss AS </a:t>
+            </a:r>
+            <a:r>
+              <a:rPr lang="en-US" dirty="0" smtClean="0"/>
+              <a:t>7 (</a:t>
+            </a:r>
+            <a:r>
+              <a:rPr lang="en-US" dirty="0" err="1" smtClean="0"/>
+              <a:t>Wildfly</a:t>
+            </a:r>
+            <a:r>
+              <a:rPr lang="en-US" dirty="0" smtClean="0"/>
+              <a:t>)</a:t>
+            </a:r>
+            <a:endParaRPr lang="en-US" dirty="0" smtClean="0"/>
           </a:p>
           <a:p>
             <a:r>
@@ -3304,8 +3317,21 @@
           <a:p>
             <a:r>
               <a:rPr lang="en-US" dirty="0" smtClean="0"/>
-              <a:t>Managed through its Management Console or Command Line Interface</a:t>
-            </a:r>
+              <a:t>Managed through its Management </a:t>
+            </a:r>
+            <a:r>
+              <a:rPr lang="en-US" dirty="0" smtClean="0"/>
+              <a:t>Console, Command </a:t>
+            </a:r>
+            <a:r>
+              <a:rPr lang="en-US" dirty="0" smtClean="0"/>
+              <a:t>Line </a:t>
+            </a:r>
+            <a:r>
+              <a:rPr lang="en-US" dirty="0" smtClean="0"/>
+              <a:t>Interface or by manually editing XML configuration</a:t>
+            </a:r>
+            <a:endParaRPr lang="en-US" dirty="0" smtClean="0"/>
           </a:p>
           <a:p>
             <a:r>

</xml_diff>